<commit_message>
Update lecture 1 slides
</commit_message>
<xml_diff>
--- a/docs/science_truth.pptx
+++ b/docs/science_truth.pptx
@@ -240,7 +240,7 @@
           <a:p>
             <a:fld id="{826BC068-B3EF-7345-960E-EBD1BBF6ABD5}" type="datetimeFigureOut">
               <a:rPr lang="en-US" smtClean="0"/>
-              <a:t>1/25/24</a:t>
+              <a:t>1/20/25</a:t>
             </a:fld>
             <a:endParaRPr lang="en-US"/>
           </a:p>
@@ -723,7 +723,7 @@
           <a:p>
             <a:fld id="{E5C141C8-61DB-4198-9B79-C4369506D355}" type="datetimeFigureOut">
               <a:rPr lang="en-GB" smtClean="0"/>
-              <a:t>25/01/2024</a:t>
+              <a:t>20/01/2025</a:t>
             </a:fld>
             <a:endParaRPr lang="en-GB"/>
           </a:p>
@@ -893,7 +893,7 @@
           <a:p>
             <a:fld id="{E5C141C8-61DB-4198-9B79-C4369506D355}" type="datetimeFigureOut">
               <a:rPr lang="en-GB" smtClean="0"/>
-              <a:t>25/01/2024</a:t>
+              <a:t>20/01/2025</a:t>
             </a:fld>
             <a:endParaRPr lang="en-GB"/>
           </a:p>
@@ -1073,7 +1073,7 @@
           <a:p>
             <a:fld id="{E5C141C8-61DB-4198-9B79-C4369506D355}" type="datetimeFigureOut">
               <a:rPr lang="en-GB" smtClean="0"/>
-              <a:t>25/01/2024</a:t>
+              <a:t>20/01/2025</a:t>
             </a:fld>
             <a:endParaRPr lang="en-GB"/>
           </a:p>
@@ -1243,7 +1243,7 @@
           <a:p>
             <a:fld id="{E5C141C8-61DB-4198-9B79-C4369506D355}" type="datetimeFigureOut">
               <a:rPr lang="en-GB" smtClean="0"/>
-              <a:t>25/01/2024</a:t>
+              <a:t>20/01/2025</a:t>
             </a:fld>
             <a:endParaRPr lang="en-GB"/>
           </a:p>
@@ -1489,7 +1489,7 @@
           <a:p>
             <a:fld id="{E5C141C8-61DB-4198-9B79-C4369506D355}" type="datetimeFigureOut">
               <a:rPr lang="en-GB" smtClean="0"/>
-              <a:t>25/01/2024</a:t>
+              <a:t>20/01/2025</a:t>
             </a:fld>
             <a:endParaRPr lang="en-GB"/>
           </a:p>
@@ -1721,7 +1721,7 @@
           <a:p>
             <a:fld id="{E5C141C8-61DB-4198-9B79-C4369506D355}" type="datetimeFigureOut">
               <a:rPr lang="en-GB" smtClean="0"/>
-              <a:t>25/01/2024</a:t>
+              <a:t>20/01/2025</a:t>
             </a:fld>
             <a:endParaRPr lang="en-GB"/>
           </a:p>
@@ -2088,7 +2088,7 @@
           <a:p>
             <a:fld id="{E5C141C8-61DB-4198-9B79-C4369506D355}" type="datetimeFigureOut">
               <a:rPr lang="en-GB" smtClean="0"/>
-              <a:t>25/01/2024</a:t>
+              <a:t>20/01/2025</a:t>
             </a:fld>
             <a:endParaRPr lang="en-GB"/>
           </a:p>
@@ -2206,7 +2206,7 @@
           <a:p>
             <a:fld id="{E5C141C8-61DB-4198-9B79-C4369506D355}" type="datetimeFigureOut">
               <a:rPr lang="en-GB" smtClean="0"/>
-              <a:t>25/01/2024</a:t>
+              <a:t>20/01/2025</a:t>
             </a:fld>
             <a:endParaRPr lang="en-GB"/>
           </a:p>
@@ -2301,7 +2301,7 @@
           <a:p>
             <a:fld id="{E5C141C8-61DB-4198-9B79-C4369506D355}" type="datetimeFigureOut">
               <a:rPr lang="en-GB" smtClean="0"/>
-              <a:t>25/01/2024</a:t>
+              <a:t>20/01/2025</a:t>
             </a:fld>
             <a:endParaRPr lang="en-GB"/>
           </a:p>
@@ -2578,7 +2578,7 @@
           <a:p>
             <a:fld id="{E5C141C8-61DB-4198-9B79-C4369506D355}" type="datetimeFigureOut">
               <a:rPr lang="en-GB" smtClean="0"/>
-              <a:t>25/01/2024</a:t>
+              <a:t>20/01/2025</a:t>
             </a:fld>
             <a:endParaRPr lang="en-GB"/>
           </a:p>
@@ -2831,7 +2831,7 @@
           <a:p>
             <a:fld id="{E5C141C8-61DB-4198-9B79-C4369506D355}" type="datetimeFigureOut">
               <a:rPr lang="en-GB" smtClean="0"/>
-              <a:t>25/01/2024</a:t>
+              <a:t>20/01/2025</a:t>
             </a:fld>
             <a:endParaRPr lang="en-GB"/>
           </a:p>
@@ -3050,7 +3050,7 @@
           <a:p>
             <a:fld id="{E5C141C8-61DB-4198-9B79-C4369506D355}" type="datetimeFigureOut">
               <a:rPr lang="en-GB" smtClean="0"/>
-              <a:t>25/01/2024</a:t>
+              <a:t>20/01/2025</a:t>
             </a:fld>
             <a:endParaRPr lang="en-GB"/>
           </a:p>
@@ -5941,16 +5941,7 @@
             </a:pPr>
             <a:r>
               <a:rPr lang="en-GB" dirty="0"/>
-              <a:t>10 x 1 hour workshops 	</a:t>
-            </a:r>
-          </a:p>
-          <a:p>
-            <a:pPr marL="0" indent="0">
-              <a:buNone/>
-            </a:pPr>
-            <a:r>
-              <a:rPr lang="en-GB" dirty="0"/>
-              <a:t>3 x 1 hour tutorials </a:t>
+              <a:t>10 x 2-hour workshops 	</a:t>
             </a:r>
           </a:p>
           <a:p>
@@ -11881,6 +11872,12 @@
 </file>
 
 <file path=customXml/item1.xml><?xml version="1.0" encoding="utf-8"?>
+<p:properties xmlns:p="http://schemas.microsoft.com/office/2006/metadata/properties" xmlns:xsi="http://www.w3.org/2001/XMLSchema-instance" xmlns:pc="http://schemas.microsoft.com/office/infopath/2007/PartnerControls">
+  <documentManagement/>
+</p:properties>
+</file>
+
+<file path=customXml/item2.xml><?xml version="1.0" encoding="utf-8"?>
 <?mso-contentType ?>
 <FormTemplates xmlns="http://schemas.microsoft.com/sharepoint/v3/contenttype/forms">
   <Display>DocumentLibraryForm</Display>
@@ -11889,7 +11886,7 @@
 </FormTemplates>
 </file>
 
-<file path=customXml/item2.xml><?xml version="1.0" encoding="utf-8"?>
+<file path=customXml/item3.xml><?xml version="1.0" encoding="utf-8"?>
 <ct:contentTypeSchema xmlns:ct="http://schemas.microsoft.com/office/2006/metadata/contentType" xmlns:ma="http://schemas.microsoft.com/office/2006/metadata/properties/metaAttributes" ct:_="" ma:_="" ma:contentTypeName="Document" ma:contentTypeID="0x010100CDC7DA200EEB3445AF1982F3D7270397" ma:contentTypeVersion="14" ma:contentTypeDescription="Create a new document." ma:contentTypeScope="" ma:versionID="8ec0b2246017092d04bce6716d92dcc9">
   <xsd:schema xmlns:xsd="http://www.w3.org/2001/XMLSchema" xmlns:xs="http://www.w3.org/2001/XMLSchema" xmlns:p="http://schemas.microsoft.com/office/2006/metadata/properties" xmlns:ns3="21c8a05f-379f-4a3f-aa4a-81ea9db359bc" xmlns:ns4="0322879f-8624-447d-a89c-1c2bd66f8e04" targetNamespace="http://schemas.microsoft.com/office/2006/metadata/properties" ma:root="true" ma:fieldsID="aa4f8e6e825201c9e1a4f40d409a5ff0" ns3:_="" ns4:_="">
     <xsd:import namespace="21c8a05f-379f-4a3f-aa4a-81ea9db359bc"/>
@@ -12118,13 +12115,24 @@
 </ct:contentTypeSchema>
 </file>
 
-<file path=customXml/item3.xml><?xml version="1.0" encoding="utf-8"?>
-<p:properties xmlns:p="http://schemas.microsoft.com/office/2006/metadata/properties" xmlns:xsi="http://www.w3.org/2001/XMLSchema-instance" xmlns:pc="http://schemas.microsoft.com/office/infopath/2007/PartnerControls">
-  <documentManagement/>
-</p:properties>
+<file path=customXml/itemProps1.xml><?xml version="1.0" encoding="utf-8"?>
+<ds:datastoreItem xmlns:ds="http://schemas.openxmlformats.org/officeDocument/2006/customXml" ds:itemID="{B6617797-34A9-4FB1-9A07-D396B12A8668}">
+  <ds:schemaRefs>
+    <ds:schemaRef ds:uri="http://purl.org/dc/terms/"/>
+    <ds:schemaRef ds:uri="http://schemas.openxmlformats.org/package/2006/metadata/core-properties"/>
+    <ds:schemaRef ds:uri="http://schemas.microsoft.com/office/2006/documentManagement/types"/>
+    <ds:schemaRef ds:uri="0322879f-8624-447d-a89c-1c2bd66f8e04"/>
+    <ds:schemaRef ds:uri="http://purl.org/dc/elements/1.1/"/>
+    <ds:schemaRef ds:uri="http://schemas.microsoft.com/office/2006/metadata/properties"/>
+    <ds:schemaRef ds:uri="http://schemas.microsoft.com/office/infopath/2007/PartnerControls"/>
+    <ds:schemaRef ds:uri="21c8a05f-379f-4a3f-aa4a-81ea9db359bc"/>
+    <ds:schemaRef ds:uri="http://www.w3.org/XML/1998/namespace"/>
+    <ds:schemaRef ds:uri="http://purl.org/dc/dcmitype/"/>
+  </ds:schemaRefs>
+</ds:datastoreItem>
 </file>
 
-<file path=customXml/itemProps1.xml><?xml version="1.0" encoding="utf-8"?>
+<file path=customXml/itemProps2.xml><?xml version="1.0" encoding="utf-8"?>
 <ds:datastoreItem xmlns:ds="http://schemas.openxmlformats.org/officeDocument/2006/customXml" ds:itemID="{F4A5D631-0828-45C2-B737-825043D01CBF}">
   <ds:schemaRefs>
     <ds:schemaRef ds:uri="http://schemas.microsoft.com/sharepoint/v3/contenttype/forms"/>
@@ -12132,7 +12140,7 @@
 </ds:datastoreItem>
 </file>
 
-<file path=customXml/itemProps2.xml><?xml version="1.0" encoding="utf-8"?>
+<file path=customXml/itemProps3.xml><?xml version="1.0" encoding="utf-8"?>
 <ds:datastoreItem xmlns:ds="http://schemas.openxmlformats.org/officeDocument/2006/customXml" ds:itemID="{007F6972-5F1F-4BEB-9345-B279380A9AAC}">
   <ds:schemaRefs>
     <ds:schemaRef ds:uri="http://schemas.microsoft.com/office/2006/metadata/contentType"/>
@@ -12149,21 +12157,4 @@
     <ds:schemaRef ds:uri="http://schemas.microsoft.com/internal/obd"/>
   </ds:schemaRefs>
 </ds:datastoreItem>
-</file>
-
-<file path=customXml/itemProps3.xml><?xml version="1.0" encoding="utf-8"?>
-<ds:datastoreItem xmlns:ds="http://schemas.openxmlformats.org/officeDocument/2006/customXml" ds:itemID="{B6617797-34A9-4FB1-9A07-D396B12A8668}">
-  <ds:schemaRefs>
-    <ds:schemaRef ds:uri="http://purl.org/dc/terms/"/>
-    <ds:schemaRef ds:uri="http://schemas.openxmlformats.org/package/2006/metadata/core-properties"/>
-    <ds:schemaRef ds:uri="http://schemas.microsoft.com/office/2006/documentManagement/types"/>
-    <ds:schemaRef ds:uri="0322879f-8624-447d-a89c-1c2bd66f8e04"/>
-    <ds:schemaRef ds:uri="http://purl.org/dc/elements/1.1/"/>
-    <ds:schemaRef ds:uri="http://schemas.microsoft.com/office/2006/metadata/properties"/>
-    <ds:schemaRef ds:uri="http://schemas.microsoft.com/office/infopath/2007/PartnerControls"/>
-    <ds:schemaRef ds:uri="21c8a05f-379f-4a3f-aa4a-81ea9db359bc"/>
-    <ds:schemaRef ds:uri="http://www.w3.org/XML/1998/namespace"/>
-    <ds:schemaRef ds:uri="http://purl.org/dc/dcmitype/"/>
-  </ds:schemaRefs>
-</ds:datastoreItem>
 </file>
</xml_diff>